<commit_message>
att navegadores Diagrama de Solução
</commit_message>
<xml_diff>
--- a/Versao geral/Diagrama/Diagrama da Solução.pptx
+++ b/Versao geral/Diagrama/Diagrama da Solução.pptx
@@ -217,7 +217,7 @@
             <a:pPr rtl="0"/>
             <a:fld id="{62356652-31DC-4771-B8C3-460305A4590D}" type="datetime1">
               <a:rPr lang="pt-BR" smtClean="0"/>
-              <a:t>07/10/2022</a:t>
+              <a:t>15/10/2022</a:t>
             </a:fld>
             <a:endParaRPr lang="pt-BR" dirty="0"/>
           </a:p>
@@ -399,7 +399,7 @@
             <a:pPr rtl="0"/>
             <a:fld id="{16319CE5-27B1-4E41-A1F2-F20CCFA1B9FD}" type="datetime1">
               <a:rPr lang="pt-BR" smtClean="0"/>
-              <a:t>07/10/2022</a:t>
+              <a:t>15/10/2022</a:t>
             </a:fld>
             <a:endParaRPr lang="pt-BR" dirty="0"/>
           </a:p>
@@ -22624,8 +22624,8 @@
         </p:nvSpPr>
         <p:spPr>
           <a:xfrm>
-            <a:off x="6660263" y="3540434"/>
-            <a:ext cx="1120450" cy="338554"/>
+            <a:off x="6583095" y="3556627"/>
+            <a:ext cx="1263401" cy="338554"/>
           </a:xfrm>
           <a:prstGeom prst="rect">
             <a:avLst/>
@@ -22648,7 +22648,7 @@
                 </a:solidFill>
                 <a:latin typeface="Bahnschrift Light Condensed" panose="020B0502040204020203" pitchFamily="34" charset="0"/>
               </a:rPr>
-              <a:t>Via internet</a:t>
+              <a:t>Via navegador</a:t>
             </a:r>
           </a:p>
         </p:txBody>
@@ -22883,6 +22883,96 @@
           </a:p>
         </p:txBody>
       </p:sp>
+      <p:pic>
+        <p:nvPicPr>
+          <p:cNvPr id="4" name="Imagem 3">
+            <a:extLst>
+              <a:ext uri="{FF2B5EF4-FFF2-40B4-BE49-F238E27FC236}">
+                <a16:creationId xmlns:a16="http://schemas.microsoft.com/office/drawing/2014/main" id="{0B9461BB-9F80-A864-ED1F-053513FDFEAC}"/>
+              </a:ext>
+            </a:extLst>
+          </p:cNvPr>
+          <p:cNvPicPr>
+            <a:picLocks noChangeAspect="1"/>
+          </p:cNvPicPr>
+          <p:nvPr/>
+        </p:nvPicPr>
+        <p:blipFill>
+          <a:blip r:embed="rId18"/>
+          <a:stretch>
+            <a:fillRect/>
+          </a:stretch>
+        </p:blipFill>
+        <p:spPr>
+          <a:xfrm>
+            <a:off x="7726954" y="3293250"/>
+            <a:ext cx="265160" cy="265160"/>
+          </a:xfrm>
+          <a:prstGeom prst="rect">
+            <a:avLst/>
+          </a:prstGeom>
+        </p:spPr>
+      </p:pic>
+      <p:pic>
+        <p:nvPicPr>
+          <p:cNvPr id="6" name="Imagem 5">
+            <a:extLst>
+              <a:ext uri="{FF2B5EF4-FFF2-40B4-BE49-F238E27FC236}">
+                <a16:creationId xmlns:a16="http://schemas.microsoft.com/office/drawing/2014/main" id="{FE4C79B5-2B9A-8ABF-C8AF-259B79C60347}"/>
+              </a:ext>
+            </a:extLst>
+          </p:cNvPr>
+          <p:cNvPicPr>
+            <a:picLocks noChangeAspect="1"/>
+          </p:cNvPicPr>
+          <p:nvPr/>
+        </p:nvPicPr>
+        <p:blipFill>
+          <a:blip r:embed="rId19"/>
+          <a:stretch>
+            <a:fillRect/>
+          </a:stretch>
+        </p:blipFill>
+        <p:spPr>
+          <a:xfrm>
+            <a:off x="8030814" y="3294101"/>
+            <a:ext cx="263458" cy="263458"/>
+          </a:xfrm>
+          <a:prstGeom prst="rect">
+            <a:avLst/>
+          </a:prstGeom>
+        </p:spPr>
+      </p:pic>
+      <p:pic>
+        <p:nvPicPr>
+          <p:cNvPr id="8" name="Imagem 7">
+            <a:extLst>
+              <a:ext uri="{FF2B5EF4-FFF2-40B4-BE49-F238E27FC236}">
+                <a16:creationId xmlns:a16="http://schemas.microsoft.com/office/drawing/2014/main" id="{61A7B606-EBB6-8D26-5D73-8D6E0575CCF5}"/>
+              </a:ext>
+            </a:extLst>
+          </p:cNvPr>
+          <p:cNvPicPr>
+            <a:picLocks noChangeAspect="1"/>
+          </p:cNvPicPr>
+          <p:nvPr/>
+        </p:nvPicPr>
+        <p:blipFill>
+          <a:blip r:embed="rId20"/>
+          <a:stretch>
+            <a:fillRect/>
+          </a:stretch>
+        </p:blipFill>
+        <p:spPr>
+          <a:xfrm>
+            <a:off x="8317841" y="3269602"/>
+            <a:ext cx="298584" cy="298584"/>
+          </a:xfrm>
+          <a:prstGeom prst="rect">
+            <a:avLst/>
+          </a:prstGeom>
+        </p:spPr>
+      </p:pic>
     </p:spTree>
     <p:extLst>
       <p:ext uri="{BB962C8B-B14F-4D97-AF65-F5344CB8AC3E}">
@@ -23670,34 +23760,6 @@
 </file>
 
 <file path=customXml/item1.xml><?xml version="1.0" encoding="utf-8"?>
-<p:properties xmlns:p="http://schemas.microsoft.com/office/2006/metadata/properties" xmlns:xsi="http://www.w3.org/2001/XMLSchema-instance" xmlns:pc="http://schemas.microsoft.com/office/infopath/2007/PartnerControls">
-  <documentManagement>
-    <Status xmlns="71af3243-3dd4-4a8d-8c0d-dd76da1f02a5">Not started</Status>
-    <_ip_UnifiedCompliancePolicyUIAction xmlns="http://schemas.microsoft.com/sharepoint/v3" xsi:nil="true"/>
-    <Image xmlns="71af3243-3dd4-4a8d-8c0d-dd76da1f02a5">
-      <Url xsi:nil="true"/>
-      <Description xsi:nil="true"/>
-    </Image>
-    <_ip_UnifiedCompliancePolicyProperties xmlns="http://schemas.microsoft.com/sharepoint/v3" xsi:nil="true"/>
-    <lcf76f155ced4ddcb4097134ff3c332f xmlns="71af3243-3dd4-4a8d-8c0d-dd76da1f02a5">
-      <Terms xmlns="http://schemas.microsoft.com/office/infopath/2007/PartnerControls"/>
-    </lcf76f155ced4ddcb4097134ff3c332f>
-    <TaxCatchAll xmlns="230e9df3-be65-4c73-a93b-d1236ebd677e"/>
-    <MediaServiceKeyPoints xmlns="71af3243-3dd4-4a8d-8c0d-dd76da1f02a5" xsi:nil="true"/>
-  </documentManagement>
-</p:properties>
-</file>
-
-<file path=customXml/item2.xml><?xml version="1.0" encoding="utf-8"?>
-<?mso-contentType ?>
-<FormTemplates xmlns="http://schemas.microsoft.com/sharepoint/v3/contenttype/forms">
-  <Display>DocumentLibraryForm</Display>
-  <Edit>DocumentLibraryForm</Edit>
-  <New>DocumentLibraryForm</New>
-</FormTemplates>
-</file>
-
-<file path=customXml/item3.xml><?xml version="1.0" encoding="utf-8"?>
 <ct:contentTypeSchema xmlns:ct="http://schemas.microsoft.com/office/2006/metadata/contentType" xmlns:ma="http://schemas.microsoft.com/office/2006/metadata/properties/metaAttributes" ct:_="" ma:_="" ma:contentTypeName="Document" ma:contentTypeID="0x01010079F111ED35F8CC479449609E8A0923A6" ma:contentTypeVersion="18" ma:contentTypeDescription="Create a new document." ma:contentTypeScope="" ma:versionID="22a266b9fa9a230c5a512669d8b298c3">
   <xsd:schema xmlns:xsd="http://www.w3.org/2001/XMLSchema" xmlns:xs="http://www.w3.org/2001/XMLSchema" xmlns:p="http://schemas.microsoft.com/office/2006/metadata/properties" xmlns:ns1="http://schemas.microsoft.com/sharepoint/v3" xmlns:ns2="71af3243-3dd4-4a8d-8c0d-dd76da1f02a5" xmlns:ns3="16c05727-aa75-4e4a-9b5f-8a80a1165891" xmlns:ns4="230e9df3-be65-4c73-a93b-d1236ebd677e" targetNamespace="http://schemas.microsoft.com/office/2006/metadata/properties" ma:root="true" ma:fieldsID="eddc33fff6b14141ee5c74a0d29ea6a1" ns1:_="" ns2:_="" ns3:_="" ns4:_="">
     <xsd:import namespace="http://schemas.microsoft.com/sharepoint/v3"/>
@@ -23973,27 +24035,35 @@
 </ct:contentTypeSchema>
 </file>
 
-<file path=customXml/itemProps1.xml><?xml version="1.0" encoding="utf-8"?>
-<ds:datastoreItem xmlns:ds="http://schemas.openxmlformats.org/officeDocument/2006/customXml" ds:itemID="{C9E13122-F311-42FD-A551-F80E95967A7B}">
-  <ds:schemaRefs>
-    <ds:schemaRef ds:uri="http://schemas.microsoft.com/office/2006/metadata/properties"/>
-    <ds:schemaRef ds:uri="http://schemas.microsoft.com/office/infopath/2007/PartnerControls"/>
-    <ds:schemaRef ds:uri="71af3243-3dd4-4a8d-8c0d-dd76da1f02a5"/>
-    <ds:schemaRef ds:uri="http://schemas.microsoft.com/sharepoint/v3"/>
-    <ds:schemaRef ds:uri="230e9df3-be65-4c73-a93b-d1236ebd677e"/>
-  </ds:schemaRefs>
-</ds:datastoreItem>
+<file path=customXml/item2.xml><?xml version="1.0" encoding="utf-8"?>
+<?mso-contentType ?>
+<FormTemplates xmlns="http://schemas.microsoft.com/sharepoint/v3/contenttype/forms">
+  <Display>DocumentLibraryForm</Display>
+  <Edit>DocumentLibraryForm</Edit>
+  <New>DocumentLibraryForm</New>
+</FormTemplates>
 </file>
 
-<file path=customXml/itemProps2.xml><?xml version="1.0" encoding="utf-8"?>
-<ds:datastoreItem xmlns:ds="http://schemas.openxmlformats.org/officeDocument/2006/customXml" ds:itemID="{E8E41239-C5EC-4F83-8E98-7D7D6C2BBFDA}">
-  <ds:schemaRefs>
-    <ds:schemaRef ds:uri="http://schemas.microsoft.com/sharepoint/v3/contenttype/forms"/>
-  </ds:schemaRefs>
-</ds:datastoreItem>
+<file path=customXml/item3.xml><?xml version="1.0" encoding="utf-8"?>
+<p:properties xmlns:p="http://schemas.microsoft.com/office/2006/metadata/properties" xmlns:xsi="http://www.w3.org/2001/XMLSchema-instance" xmlns:pc="http://schemas.microsoft.com/office/infopath/2007/PartnerControls">
+  <documentManagement>
+    <Status xmlns="71af3243-3dd4-4a8d-8c0d-dd76da1f02a5">Not started</Status>
+    <_ip_UnifiedCompliancePolicyUIAction xmlns="http://schemas.microsoft.com/sharepoint/v3" xsi:nil="true"/>
+    <Image xmlns="71af3243-3dd4-4a8d-8c0d-dd76da1f02a5">
+      <Url xsi:nil="true"/>
+      <Description xsi:nil="true"/>
+    </Image>
+    <_ip_UnifiedCompliancePolicyProperties xmlns="http://schemas.microsoft.com/sharepoint/v3" xsi:nil="true"/>
+    <lcf76f155ced4ddcb4097134ff3c332f xmlns="71af3243-3dd4-4a8d-8c0d-dd76da1f02a5">
+      <Terms xmlns="http://schemas.microsoft.com/office/infopath/2007/PartnerControls"/>
+    </lcf76f155ced4ddcb4097134ff3c332f>
+    <TaxCatchAll xmlns="230e9df3-be65-4c73-a93b-d1236ebd677e"/>
+    <MediaServiceKeyPoints xmlns="71af3243-3dd4-4a8d-8c0d-dd76da1f02a5" xsi:nil="true"/>
+  </documentManagement>
+</p:properties>
 </file>
 
-<file path=customXml/itemProps3.xml><?xml version="1.0" encoding="utf-8"?>
+<file path=customXml/itemProps1.xml><?xml version="1.0" encoding="utf-8"?>
 <ds:datastoreItem xmlns:ds="http://schemas.openxmlformats.org/officeDocument/2006/customXml" ds:itemID="{4BD88FD9-F816-4DDA-AB4F-EFDCB988DBD5}">
   <ds:schemaRefs>
     <ds:schemaRef ds:uri="http://schemas.microsoft.com/office/2006/metadata/contentType"/>
@@ -24012,4 +24082,24 @@
     <ds:schemaRef ds:uri="http://schemas.microsoft.com/internal/obd"/>
   </ds:schemaRefs>
 </ds:datastoreItem>
+</file>
+
+<file path=customXml/itemProps2.xml><?xml version="1.0" encoding="utf-8"?>
+<ds:datastoreItem xmlns:ds="http://schemas.openxmlformats.org/officeDocument/2006/customXml" ds:itemID="{E8E41239-C5EC-4F83-8E98-7D7D6C2BBFDA}">
+  <ds:schemaRefs>
+    <ds:schemaRef ds:uri="http://schemas.microsoft.com/sharepoint/v3/contenttype/forms"/>
+  </ds:schemaRefs>
+</ds:datastoreItem>
+</file>
+
+<file path=customXml/itemProps3.xml><?xml version="1.0" encoding="utf-8"?>
+<ds:datastoreItem xmlns:ds="http://schemas.openxmlformats.org/officeDocument/2006/customXml" ds:itemID="{C9E13122-F311-42FD-A551-F80E95967A7B}">
+  <ds:schemaRefs>
+    <ds:schemaRef ds:uri="http://schemas.microsoft.com/office/2006/metadata/properties"/>
+    <ds:schemaRef ds:uri="http://schemas.microsoft.com/office/infopath/2007/PartnerControls"/>
+    <ds:schemaRef ds:uri="71af3243-3dd4-4a8d-8c0d-dd76da1f02a5"/>
+    <ds:schemaRef ds:uri="http://schemas.microsoft.com/sharepoint/v3"/>
+    <ds:schemaRef ds:uri="230e9df3-be65-4c73-a93b-d1236ebd677e"/>
+  </ds:schemaRefs>
+</ds:datastoreItem>
 </file>
</xml_diff>